<commit_message>
Deploying to gh-pages from @ wengzf20/learnjekyll@ffc425f6529993c220d63fc20a80f453d9154cbe 🚀
</commit_message>
<xml_diff>
--- a/assets/img/project_thumbnail/template.pptx
+++ b/assets/img/project_thumbnail/template.pptx
@@ -243,7 +243,7 @@
           <a:p>
             <a:fld id="{18ED1853-EC6A-F244-8D3B-C13A21A74960}" type="datetimeFigureOut">
               <a:rPr lang="en-US" smtClean="0"/>
-              <a:t>2/2/24</a:t>
+              <a:t>2/3/24</a:t>
             </a:fld>
             <a:endParaRPr lang="en-US"/>
           </a:p>
@@ -413,7 +413,7 @@
           <a:p>
             <a:fld id="{18ED1853-EC6A-F244-8D3B-C13A21A74960}" type="datetimeFigureOut">
               <a:rPr lang="en-US" smtClean="0"/>
-              <a:t>2/2/24</a:t>
+              <a:t>2/3/24</a:t>
             </a:fld>
             <a:endParaRPr lang="en-US"/>
           </a:p>
@@ -593,7 +593,7 @@
           <a:p>
             <a:fld id="{18ED1853-EC6A-F244-8D3B-C13A21A74960}" type="datetimeFigureOut">
               <a:rPr lang="en-US" smtClean="0"/>
-              <a:t>2/2/24</a:t>
+              <a:t>2/3/24</a:t>
             </a:fld>
             <a:endParaRPr lang="en-US"/>
           </a:p>
@@ -763,7 +763,7 @@
           <a:p>
             <a:fld id="{18ED1853-EC6A-F244-8D3B-C13A21A74960}" type="datetimeFigureOut">
               <a:rPr lang="en-US" smtClean="0"/>
-              <a:t>2/2/24</a:t>
+              <a:t>2/3/24</a:t>
             </a:fld>
             <a:endParaRPr lang="en-US"/>
           </a:p>
@@ -1007,7 +1007,7 @@
           <a:p>
             <a:fld id="{18ED1853-EC6A-F244-8D3B-C13A21A74960}" type="datetimeFigureOut">
               <a:rPr lang="en-US" smtClean="0"/>
-              <a:t>2/2/24</a:t>
+              <a:t>2/3/24</a:t>
             </a:fld>
             <a:endParaRPr lang="en-US"/>
           </a:p>
@@ -1239,7 +1239,7 @@
           <a:p>
             <a:fld id="{18ED1853-EC6A-F244-8D3B-C13A21A74960}" type="datetimeFigureOut">
               <a:rPr lang="en-US" smtClean="0"/>
-              <a:t>2/2/24</a:t>
+              <a:t>2/3/24</a:t>
             </a:fld>
             <a:endParaRPr lang="en-US"/>
           </a:p>
@@ -1606,7 +1606,7 @@
           <a:p>
             <a:fld id="{18ED1853-EC6A-F244-8D3B-C13A21A74960}" type="datetimeFigureOut">
               <a:rPr lang="en-US" smtClean="0"/>
-              <a:t>2/2/24</a:t>
+              <a:t>2/3/24</a:t>
             </a:fld>
             <a:endParaRPr lang="en-US"/>
           </a:p>
@@ -1724,7 +1724,7 @@
           <a:p>
             <a:fld id="{18ED1853-EC6A-F244-8D3B-C13A21A74960}" type="datetimeFigureOut">
               <a:rPr lang="en-US" smtClean="0"/>
-              <a:t>2/2/24</a:t>
+              <a:t>2/3/24</a:t>
             </a:fld>
             <a:endParaRPr lang="en-US"/>
           </a:p>
@@ -1819,7 +1819,7 @@
           <a:p>
             <a:fld id="{18ED1853-EC6A-F244-8D3B-C13A21A74960}" type="datetimeFigureOut">
               <a:rPr lang="en-US" smtClean="0"/>
-              <a:t>2/2/24</a:t>
+              <a:t>2/3/24</a:t>
             </a:fld>
             <a:endParaRPr lang="en-US"/>
           </a:p>
@@ -2096,7 +2096,7 @@
           <a:p>
             <a:fld id="{18ED1853-EC6A-F244-8D3B-C13A21A74960}" type="datetimeFigureOut">
               <a:rPr lang="en-US" smtClean="0"/>
-              <a:t>2/2/24</a:t>
+              <a:t>2/3/24</a:t>
             </a:fld>
             <a:endParaRPr lang="en-US"/>
           </a:p>
@@ -2353,7 +2353,7 @@
           <a:p>
             <a:fld id="{18ED1853-EC6A-F244-8D3B-C13A21A74960}" type="datetimeFigureOut">
               <a:rPr lang="en-US" smtClean="0"/>
-              <a:t>2/2/24</a:t>
+              <a:t>2/3/24</a:t>
             </a:fld>
             <a:endParaRPr lang="en-US"/>
           </a:p>
@@ -2566,7 +2566,7 @@
           <a:p>
             <a:fld id="{18ED1853-EC6A-F244-8D3B-C13A21A74960}" type="datetimeFigureOut">
               <a:rPr lang="en-US" smtClean="0"/>
-              <a:t>2/2/24</a:t>
+              <a:t>2/3/24</a:t>
             </a:fld>
             <a:endParaRPr lang="en-US"/>
           </a:p>
@@ -2971,35 +2971,584 @@
           <a:chExt cx="0" cy="0"/>
         </a:xfrm>
       </p:grpSpPr>
-      <p:pic>
-        <p:nvPicPr>
-          <p:cNvPr id="11" name="Picture 10">
+      <p:grpSp>
+        <p:nvGrpSpPr>
+          <p:cNvPr id="5" name="Group 4">
             <a:extLst>
               <a:ext uri="{FF2B5EF4-FFF2-40B4-BE49-F238E27FC236}">
-                <a16:creationId xmlns:a16="http://schemas.microsoft.com/office/drawing/2014/main" id="{3E5C8C18-1B4A-004F-BE78-8BE9DA4513AC}"/>
+                <a16:creationId xmlns:a16="http://schemas.microsoft.com/office/drawing/2014/main" id="{2F0A473B-3128-7D49-84D7-B0B83F58DC6F}"/>
               </a:ext>
             </a:extLst>
           </p:cNvPr>
-          <p:cNvPicPr>
-            <a:picLocks noChangeAspect="1"/>
-          </p:cNvPicPr>
+          <p:cNvGrpSpPr/>
           <p:nvPr/>
-        </p:nvPicPr>
-        <p:blipFill rotWithShape="1">
-          <a:blip r:embed="rId2"/>
-          <a:srcRect l="11183" t="28070" r="1689" b="19535"/>
-          <a:stretch/>
-        </p:blipFill>
-        <p:spPr>
+        </p:nvGrpSpPr>
+        <p:grpSpPr>
           <a:xfrm>
-            <a:off x="-5556" y="476249"/>
-            <a:ext cx="2374900" cy="701675"/>
+            <a:off x="-107302" y="521022"/>
+            <a:ext cx="3004457" cy="752397"/>
+            <a:chOff x="-107302" y="521022"/>
+            <a:chExt cx="3004457" cy="752397"/>
           </a:xfrm>
-          <a:prstGeom prst="rect">
-            <a:avLst/>
-          </a:prstGeom>
-        </p:spPr>
-      </p:pic>
+        </p:grpSpPr>
+        <p:sp>
+          <p:nvSpPr>
+            <p:cNvPr id="4" name="Rectangle 3">
+              <a:extLst>
+                <a:ext uri="{FF2B5EF4-FFF2-40B4-BE49-F238E27FC236}">
+                  <a16:creationId xmlns:a16="http://schemas.microsoft.com/office/drawing/2014/main" id="{ED351367-9664-8A4A-AB04-FB86B1408DF4}"/>
+                </a:ext>
+              </a:extLst>
+            </p:cNvPr>
+            <p:cNvSpPr/>
+            <p:nvPr/>
+          </p:nvSpPr>
+          <p:spPr>
+            <a:xfrm>
+              <a:off x="-107302" y="521022"/>
+              <a:ext cx="3004457" cy="752397"/>
+            </a:xfrm>
+            <a:prstGeom prst="rect">
+              <a:avLst/>
+            </a:prstGeom>
+            <a:solidFill>
+              <a:schemeClr val="bg1"/>
+            </a:solidFill>
+            <a:ln>
+              <a:solidFill>
+                <a:schemeClr val="bg1"/>
+              </a:solidFill>
+            </a:ln>
+          </p:spPr>
+          <p:style>
+            <a:lnRef idx="2">
+              <a:schemeClr val="accent1">
+                <a:shade val="50000"/>
+              </a:schemeClr>
+            </a:lnRef>
+            <a:fillRef idx="1">
+              <a:schemeClr val="accent1"/>
+            </a:fillRef>
+            <a:effectRef idx="0">
+              <a:schemeClr val="accent1"/>
+            </a:effectRef>
+            <a:fontRef idx="minor">
+              <a:schemeClr val="lt1"/>
+            </a:fontRef>
+          </p:style>
+          <p:txBody>
+            <a:bodyPr rtlCol="0" anchor="ctr"/>
+            <a:lstStyle/>
+            <a:p>
+              <a:pPr algn="ctr"/>
+              <a:endParaRPr lang="en-US"/>
+            </a:p>
+          </p:txBody>
+        </p:sp>
+        <p:grpSp>
+          <p:nvGrpSpPr>
+            <p:cNvPr id="6" name="Group 5">
+              <a:extLst>
+                <a:ext uri="{FF2B5EF4-FFF2-40B4-BE49-F238E27FC236}">
+                  <a16:creationId xmlns:a16="http://schemas.microsoft.com/office/drawing/2014/main" id="{FB57313C-36B5-6048-8226-7C77E96356C8}"/>
+                </a:ext>
+              </a:extLst>
+            </p:cNvPr>
+            <p:cNvGrpSpPr/>
+            <p:nvPr/>
+          </p:nvGrpSpPr>
+          <p:grpSpPr>
+            <a:xfrm>
+              <a:off x="0" y="611435"/>
+              <a:ext cx="2783140" cy="580900"/>
+              <a:chOff x="1610727" y="2605304"/>
+              <a:chExt cx="2783140" cy="580900"/>
+            </a:xfrm>
+          </p:grpSpPr>
+          <p:grpSp>
+            <p:nvGrpSpPr>
+              <p:cNvPr id="8" name="Group 7">
+                <a:extLst>
+                  <a:ext uri="{FF2B5EF4-FFF2-40B4-BE49-F238E27FC236}">
+                    <a16:creationId xmlns:a16="http://schemas.microsoft.com/office/drawing/2014/main" id="{E820944C-5C00-1C4D-9418-EF2080369351}"/>
+                  </a:ext>
+                </a:extLst>
+              </p:cNvPr>
+              <p:cNvGrpSpPr/>
+              <p:nvPr/>
+            </p:nvGrpSpPr>
+            <p:grpSpPr>
+              <a:xfrm>
+                <a:off x="1610727" y="2685826"/>
+                <a:ext cx="801226" cy="419857"/>
+                <a:chOff x="1407449" y="5933395"/>
+                <a:chExt cx="1025595" cy="537431"/>
+              </a:xfrm>
+            </p:grpSpPr>
+            <p:sp>
+              <p:nvSpPr>
+                <p:cNvPr id="17" name="Oval 16">
+                  <a:extLst>
+                    <a:ext uri="{FF2B5EF4-FFF2-40B4-BE49-F238E27FC236}">
+                      <a16:creationId xmlns:a16="http://schemas.microsoft.com/office/drawing/2014/main" id="{EE3E81BF-8554-9D48-8AA9-3F4AEF620D87}"/>
+                    </a:ext>
+                  </a:extLst>
+                </p:cNvPr>
+                <p:cNvSpPr/>
+                <p:nvPr/>
+              </p:nvSpPr>
+              <p:spPr>
+                <a:xfrm>
+                  <a:off x="1407449" y="5933395"/>
+                  <a:ext cx="537431" cy="537431"/>
+                </a:xfrm>
+                <a:prstGeom prst="ellipse">
+                  <a:avLst/>
+                </a:prstGeom>
+                <a:gradFill flip="none" rotWithShape="1">
+                  <a:gsLst>
+                    <a:gs pos="0">
+                      <a:schemeClr val="accent1">
+                        <a:lumMod val="5000"/>
+                        <a:lumOff val="95000"/>
+                      </a:schemeClr>
+                    </a:gs>
+                    <a:gs pos="86000">
+                      <a:srgbClr val="FF0000"/>
+                    </a:gs>
+                    <a:gs pos="52000">
+                      <a:schemeClr val="accent2"/>
+                    </a:gs>
+                  </a:gsLst>
+                  <a:path path="circle">
+                    <a:fillToRect l="50000" t="50000" r="50000" b="50000"/>
+                  </a:path>
+                  <a:tileRect/>
+                </a:gradFill>
+                <a:ln>
+                  <a:noFill/>
+                </a:ln>
+              </p:spPr>
+              <p:style>
+                <a:lnRef idx="2">
+                  <a:schemeClr val="accent1">
+                    <a:shade val="50000"/>
+                  </a:schemeClr>
+                </a:lnRef>
+                <a:fillRef idx="1">
+                  <a:schemeClr val="accent1"/>
+                </a:fillRef>
+                <a:effectRef idx="0">
+                  <a:schemeClr val="accent1"/>
+                </a:effectRef>
+                <a:fontRef idx="minor">
+                  <a:schemeClr val="lt1"/>
+                </a:fontRef>
+              </p:style>
+              <p:txBody>
+                <a:bodyPr rtlCol="0" anchor="ctr"/>
+                <a:lstStyle/>
+                <a:p>
+                  <a:pPr algn="ctr"/>
+                  <a:endParaRPr lang="en-CN"/>
+                </a:p>
+              </p:txBody>
+            </p:sp>
+            <p:sp>
+              <p:nvSpPr>
+                <p:cNvPr id="18" name="Cube 17">
+                  <a:extLst>
+                    <a:ext uri="{FF2B5EF4-FFF2-40B4-BE49-F238E27FC236}">
+                      <a16:creationId xmlns:a16="http://schemas.microsoft.com/office/drawing/2014/main" id="{99B9C699-E7D2-7642-8B6B-EEF21A2BFD6E}"/>
+                    </a:ext>
+                  </a:extLst>
+                </p:cNvPr>
+                <p:cNvSpPr/>
+                <p:nvPr/>
+              </p:nvSpPr>
+              <p:spPr>
+                <a:xfrm>
+                  <a:off x="2093165" y="6154912"/>
+                  <a:ext cx="101129" cy="94397"/>
+                </a:xfrm>
+                <a:prstGeom prst="cube">
+                  <a:avLst/>
+                </a:prstGeom>
+                <a:solidFill>
+                  <a:schemeClr val="bg1">
+                    <a:lumMod val="75000"/>
+                  </a:schemeClr>
+                </a:solidFill>
+                <a:ln>
+                  <a:solidFill>
+                    <a:srgbClr val="0000FF"/>
+                  </a:solidFill>
+                </a:ln>
+              </p:spPr>
+              <p:style>
+                <a:lnRef idx="2">
+                  <a:schemeClr val="accent1">
+                    <a:shade val="50000"/>
+                  </a:schemeClr>
+                </a:lnRef>
+                <a:fillRef idx="1">
+                  <a:schemeClr val="accent1"/>
+                </a:fillRef>
+                <a:effectRef idx="0">
+                  <a:schemeClr val="accent1"/>
+                </a:effectRef>
+                <a:fontRef idx="minor">
+                  <a:schemeClr val="lt1"/>
+                </a:fontRef>
+              </p:style>
+              <p:txBody>
+                <a:bodyPr rtlCol="0" anchor="ctr"/>
+                <a:lstStyle/>
+                <a:p>
+                  <a:pPr algn="ctr"/>
+                  <a:endParaRPr lang="en-CN"/>
+                </a:p>
+              </p:txBody>
+            </p:sp>
+            <p:cxnSp>
+              <p:nvCxnSpPr>
+                <p:cNvPr id="19" name="Straight Arrow Connector 18">
+                  <a:extLst>
+                    <a:ext uri="{FF2B5EF4-FFF2-40B4-BE49-F238E27FC236}">
+                      <a16:creationId xmlns:a16="http://schemas.microsoft.com/office/drawing/2014/main" id="{1C6F6697-670A-9A48-96FE-F4600C375831}"/>
+                    </a:ext>
+                  </a:extLst>
+                </p:cNvPr>
+                <p:cNvCxnSpPr>
+                  <a:cxnSpLocks/>
+                </p:cNvCxnSpPr>
+                <p:nvPr/>
+              </p:nvCxnSpPr>
+              <p:spPr>
+                <a:xfrm>
+                  <a:off x="2194294" y="6202110"/>
+                  <a:ext cx="238750" cy="0"/>
+                </a:xfrm>
+                <a:prstGeom prst="straightConnector1">
+                  <a:avLst/>
+                </a:prstGeom>
+                <a:ln>
+                  <a:solidFill>
+                    <a:srgbClr val="FF0000"/>
+                  </a:solidFill>
+                  <a:tailEnd type="triangle"/>
+                </a:ln>
+              </p:spPr>
+              <p:style>
+                <a:lnRef idx="1">
+                  <a:schemeClr val="accent1"/>
+                </a:lnRef>
+                <a:fillRef idx="0">
+                  <a:schemeClr val="accent1"/>
+                </a:fillRef>
+                <a:effectRef idx="0">
+                  <a:schemeClr val="accent1"/>
+                </a:effectRef>
+                <a:fontRef idx="minor">
+                  <a:schemeClr val="tx1"/>
+                </a:fontRef>
+              </p:style>
+            </p:cxnSp>
+          </p:grpSp>
+          <p:grpSp>
+            <p:nvGrpSpPr>
+              <p:cNvPr id="9" name="Group 8">
+                <a:extLst>
+                  <a:ext uri="{FF2B5EF4-FFF2-40B4-BE49-F238E27FC236}">
+                    <a16:creationId xmlns:a16="http://schemas.microsoft.com/office/drawing/2014/main" id="{EBA33A11-B887-F140-9822-08D2C5C7E4FA}"/>
+                  </a:ext>
+                </a:extLst>
+              </p:cNvPr>
+              <p:cNvGrpSpPr/>
+              <p:nvPr/>
+            </p:nvGrpSpPr>
+            <p:grpSpPr>
+              <a:xfrm>
+                <a:off x="2704760" y="2641759"/>
+                <a:ext cx="593541" cy="514897"/>
+                <a:chOff x="2662955" y="5933394"/>
+                <a:chExt cx="759752" cy="659085"/>
+              </a:xfrm>
+            </p:grpSpPr>
+            <p:sp>
+              <p:nvSpPr>
+                <p:cNvPr id="15" name="Oval 14">
+                  <a:extLst>
+                    <a:ext uri="{FF2B5EF4-FFF2-40B4-BE49-F238E27FC236}">
+                      <a16:creationId xmlns:a16="http://schemas.microsoft.com/office/drawing/2014/main" id="{F594EEF0-A3CF-9D4F-9C6D-14575650D53E}"/>
+                    </a:ext>
+                  </a:extLst>
+                </p:cNvPr>
+                <p:cNvSpPr/>
+                <p:nvPr/>
+              </p:nvSpPr>
+              <p:spPr>
+                <a:xfrm>
+                  <a:off x="2662955" y="5933394"/>
+                  <a:ext cx="659085" cy="659085"/>
+                </a:xfrm>
+                <a:prstGeom prst="ellipse">
+                  <a:avLst/>
+                </a:prstGeom>
+                <a:gradFill flip="none" rotWithShape="1">
+                  <a:gsLst>
+                    <a:gs pos="0">
+                      <a:schemeClr val="accent1">
+                        <a:lumMod val="5000"/>
+                        <a:lumOff val="95000"/>
+                      </a:schemeClr>
+                    </a:gs>
+                    <a:gs pos="86000">
+                      <a:srgbClr val="FF0000"/>
+                    </a:gs>
+                    <a:gs pos="52000">
+                      <a:schemeClr val="accent2"/>
+                    </a:gs>
+                  </a:gsLst>
+                  <a:path path="circle">
+                    <a:fillToRect l="50000" t="50000" r="50000" b="50000"/>
+                  </a:path>
+                  <a:tileRect/>
+                </a:gradFill>
+                <a:ln>
+                  <a:noFill/>
+                </a:ln>
+              </p:spPr>
+              <p:style>
+                <a:lnRef idx="2">
+                  <a:schemeClr val="accent1">
+                    <a:shade val="50000"/>
+                  </a:schemeClr>
+                </a:lnRef>
+                <a:fillRef idx="1">
+                  <a:schemeClr val="accent1"/>
+                </a:fillRef>
+                <a:effectRef idx="0">
+                  <a:schemeClr val="accent1"/>
+                </a:effectRef>
+                <a:fontRef idx="minor">
+                  <a:schemeClr val="lt1"/>
+                </a:fontRef>
+              </p:style>
+              <p:txBody>
+                <a:bodyPr rtlCol="0" anchor="ctr"/>
+                <a:lstStyle/>
+                <a:p>
+                  <a:pPr algn="ctr"/>
+                  <a:endParaRPr lang="en-CN"/>
+                </a:p>
+              </p:txBody>
+            </p:sp>
+            <p:sp>
+              <p:nvSpPr>
+                <p:cNvPr id="16" name="Cube 15">
+                  <a:extLst>
+                    <a:ext uri="{FF2B5EF4-FFF2-40B4-BE49-F238E27FC236}">
+                      <a16:creationId xmlns:a16="http://schemas.microsoft.com/office/drawing/2014/main" id="{E5C4E242-E808-A946-9328-2B45B4C891E4}"/>
+                    </a:ext>
+                  </a:extLst>
+                </p:cNvPr>
+                <p:cNvSpPr/>
+                <p:nvPr/>
+              </p:nvSpPr>
+              <p:spPr>
+                <a:xfrm>
+                  <a:off x="3253234" y="6183841"/>
+                  <a:ext cx="169473" cy="158191"/>
+                </a:xfrm>
+                <a:prstGeom prst="cube">
+                  <a:avLst/>
+                </a:prstGeom>
+                <a:solidFill>
+                  <a:schemeClr val="bg1">
+                    <a:lumMod val="75000"/>
+                  </a:schemeClr>
+                </a:solidFill>
+                <a:ln>
+                  <a:solidFill>
+                    <a:srgbClr val="0000FF"/>
+                  </a:solidFill>
+                </a:ln>
+              </p:spPr>
+              <p:style>
+                <a:lnRef idx="2">
+                  <a:schemeClr val="accent1">
+                    <a:shade val="50000"/>
+                  </a:schemeClr>
+                </a:lnRef>
+                <a:fillRef idx="1">
+                  <a:schemeClr val="accent1"/>
+                </a:fillRef>
+                <a:effectRef idx="0">
+                  <a:schemeClr val="accent1"/>
+                </a:effectRef>
+                <a:fontRef idx="minor">
+                  <a:schemeClr val="lt1"/>
+                </a:fontRef>
+              </p:style>
+              <p:txBody>
+                <a:bodyPr rtlCol="0" anchor="ctr"/>
+                <a:lstStyle/>
+                <a:p>
+                  <a:pPr algn="ctr"/>
+                  <a:endParaRPr lang="en-CN"/>
+                </a:p>
+              </p:txBody>
+            </p:sp>
+          </p:grpSp>
+          <p:grpSp>
+            <p:nvGrpSpPr>
+              <p:cNvPr id="10" name="Group 9">
+                <a:extLst>
+                  <a:ext uri="{FF2B5EF4-FFF2-40B4-BE49-F238E27FC236}">
+                    <a16:creationId xmlns:a16="http://schemas.microsoft.com/office/drawing/2014/main" id="{DDAFF8C2-7C26-E841-896C-3061A9821528}"/>
+                  </a:ext>
+                </a:extLst>
+              </p:cNvPr>
+              <p:cNvGrpSpPr/>
+              <p:nvPr/>
+            </p:nvGrpSpPr>
+            <p:grpSpPr>
+              <a:xfrm>
+                <a:off x="3812967" y="2605304"/>
+                <a:ext cx="580900" cy="580900"/>
+                <a:chOff x="3827833" y="5894550"/>
+                <a:chExt cx="743571" cy="743571"/>
+              </a:xfrm>
+            </p:grpSpPr>
+            <p:sp>
+              <p:nvSpPr>
+                <p:cNvPr id="12" name="Oval 11">
+                  <a:extLst>
+                    <a:ext uri="{FF2B5EF4-FFF2-40B4-BE49-F238E27FC236}">
+                      <a16:creationId xmlns:a16="http://schemas.microsoft.com/office/drawing/2014/main" id="{065CB856-11D0-1945-8FE9-896C8CCF5D37}"/>
+                    </a:ext>
+                  </a:extLst>
+                </p:cNvPr>
+                <p:cNvSpPr/>
+                <p:nvPr/>
+              </p:nvSpPr>
+              <p:spPr>
+                <a:xfrm>
+                  <a:off x="3827833" y="5894550"/>
+                  <a:ext cx="743571" cy="743571"/>
+                </a:xfrm>
+                <a:prstGeom prst="ellipse">
+                  <a:avLst/>
+                </a:prstGeom>
+                <a:gradFill flip="none" rotWithShape="1">
+                  <a:gsLst>
+                    <a:gs pos="0">
+                      <a:schemeClr val="accent1">
+                        <a:lumMod val="5000"/>
+                        <a:lumOff val="95000"/>
+                      </a:schemeClr>
+                    </a:gs>
+                    <a:gs pos="86000">
+                      <a:srgbClr val="FF0000"/>
+                    </a:gs>
+                    <a:gs pos="52000">
+                      <a:schemeClr val="accent2"/>
+                    </a:gs>
+                  </a:gsLst>
+                  <a:path path="circle">
+                    <a:fillToRect l="50000" t="50000" r="50000" b="50000"/>
+                  </a:path>
+                  <a:tileRect/>
+                </a:gradFill>
+                <a:ln>
+                  <a:noFill/>
+                </a:ln>
+              </p:spPr>
+              <p:style>
+                <a:lnRef idx="2">
+                  <a:schemeClr val="accent1">
+                    <a:shade val="50000"/>
+                  </a:schemeClr>
+                </a:lnRef>
+                <a:fillRef idx="1">
+                  <a:schemeClr val="accent1"/>
+                </a:fillRef>
+                <a:effectRef idx="0">
+                  <a:schemeClr val="accent1"/>
+                </a:effectRef>
+                <a:fontRef idx="minor">
+                  <a:schemeClr val="lt1"/>
+                </a:fontRef>
+              </p:style>
+              <p:txBody>
+                <a:bodyPr rtlCol="0" anchor="ctr"/>
+                <a:lstStyle/>
+                <a:p>
+                  <a:pPr algn="ctr"/>
+                  <a:endParaRPr lang="en-CN" dirty="0"/>
+                </a:p>
+              </p:txBody>
+            </p:sp>
+            <p:sp>
+              <p:nvSpPr>
+                <p:cNvPr id="14" name="Cube 13">
+                  <a:extLst>
+                    <a:ext uri="{FF2B5EF4-FFF2-40B4-BE49-F238E27FC236}">
+                      <a16:creationId xmlns:a16="http://schemas.microsoft.com/office/drawing/2014/main" id="{2AC760C1-9A09-2A4B-8751-280F3CEE69AD}"/>
+                    </a:ext>
+                  </a:extLst>
+                </p:cNvPr>
+                <p:cNvSpPr/>
+                <p:nvPr/>
+              </p:nvSpPr>
+              <p:spPr>
+                <a:xfrm>
+                  <a:off x="4321462" y="6187240"/>
+                  <a:ext cx="169473" cy="158191"/>
+                </a:xfrm>
+                <a:prstGeom prst="cube">
+                  <a:avLst/>
+                </a:prstGeom>
+                <a:solidFill>
+                  <a:schemeClr val="bg1">
+                    <a:lumMod val="75000"/>
+                  </a:schemeClr>
+                </a:solidFill>
+                <a:ln>
+                  <a:solidFill>
+                    <a:srgbClr val="0000FF"/>
+                  </a:solidFill>
+                </a:ln>
+              </p:spPr>
+              <p:style>
+                <a:lnRef idx="2">
+                  <a:schemeClr val="accent1">
+                    <a:shade val="50000"/>
+                  </a:schemeClr>
+                </a:lnRef>
+                <a:fillRef idx="1">
+                  <a:schemeClr val="accent1"/>
+                </a:fillRef>
+                <a:effectRef idx="0">
+                  <a:schemeClr val="accent1"/>
+                </a:effectRef>
+                <a:fontRef idx="minor">
+                  <a:schemeClr val="lt1"/>
+                </a:fontRef>
+              </p:style>
+              <p:txBody>
+                <a:bodyPr rtlCol="0" anchor="ctr"/>
+                <a:lstStyle/>
+                <a:p>
+                  <a:pPr algn="ctr"/>
+                  <a:endParaRPr lang="en-CN"/>
+                </a:p>
+              </p:txBody>
+            </p:sp>
+          </p:grpSp>
+        </p:grpSp>
+      </p:grpSp>
     </p:spTree>
     <p:extLst>
       <p:ext uri="{BB962C8B-B14F-4D97-AF65-F5344CB8AC3E}">

</xml_diff>